<commit_message>
Updating presentation with modeling changes after previous update and adding project running demonstration
</commit_message>
<xml_diff>
--- a/Entrega 2/apresentacao/Apresentação APS RUP.pptx
+++ b/Entrega 2/apresentacao/Apresentação APS RUP.pptx
@@ -20173,8 +20173,8 @@
         </p:blipFill>
         <p:spPr>
           <a:xfrm>
-            <a:off x="0" y="989561"/>
-            <a:ext cx="9143999" cy="3164378"/>
+            <a:off x="152400" y="659542"/>
+            <a:ext cx="9143998" cy="4129215"/>
           </a:xfrm>
           <a:prstGeom prst="rect">
             <a:avLst/>
@@ -20304,8 +20304,8 @@
         </p:blipFill>
         <p:spPr>
           <a:xfrm>
-            <a:off x="16737" y="361900"/>
-            <a:ext cx="9110526" cy="4613000"/>
+            <a:off x="185287" y="218650"/>
+            <a:ext cx="8773425" cy="4706201"/>
           </a:xfrm>
           <a:prstGeom prst="rect">
             <a:avLst/>
@@ -20461,8 +20461,8 @@
         </p:blipFill>
         <p:spPr>
           <a:xfrm>
-            <a:off x="1287438" y="37150"/>
-            <a:ext cx="6569126" cy="5069200"/>
+            <a:off x="968575" y="190900"/>
+            <a:ext cx="7455064" cy="4838699"/>
           </a:xfrm>
           <a:prstGeom prst="rect">
             <a:avLst/>
@@ -20645,8 +20645,8 @@
         </p:blipFill>
         <p:spPr>
           <a:xfrm>
-            <a:off x="152400" y="1338175"/>
-            <a:ext cx="8839200" cy="1375606"/>
+            <a:off x="106200" y="1291975"/>
+            <a:ext cx="8839201" cy="2471980"/>
           </a:xfrm>
           <a:prstGeom prst="rect">
             <a:avLst/>

</xml_diff>